<commit_message>
Update FIAP-QualidProjSW-Aula-1-Introducao Qualidade - EXERCICIOS.pptx
Mudança de texto no documento ppt
</commit_message>
<xml_diff>
--- a/Documentacao/FIAP-QualidProjSW-Aula-1-Introducao Qualidade - EXERCICIOS.pptx
+++ b/Documentacao/FIAP-QualidProjSW-Aula-1-Introducao Qualidade - EXERCICIOS.pptx
@@ -217,7 +217,7 @@
           <a:p>
             <a:fld id="{B6D4C934-FEA0-426E-B081-61FE807EA637}" type="datetimeFigureOut">
               <a:rPr lang="pt-BR" smtClean="0"/>
-              <a:t>22/01/2020</a:t>
+              <a:t>26/03/2020</a:t>
             </a:fld>
             <a:endParaRPr lang="pt-BR"/>
           </a:p>
@@ -1441,7 +1441,7 @@
           <a:p>
             <a:fld id="{89C4B140-6DEB-45EB-A5FE-2FE213A19AB6}" type="datetimeFigureOut">
               <a:rPr lang="pt-BR" smtClean="0"/>
-              <a:t>22/01/2020</a:t>
+              <a:t>26/03/2020</a:t>
             </a:fld>
             <a:endParaRPr lang="pt-BR"/>
           </a:p>
@@ -1649,7 +1649,7 @@
           <a:p>
             <a:fld id="{89C4B140-6DEB-45EB-A5FE-2FE213A19AB6}" type="datetimeFigureOut">
               <a:rPr lang="pt-BR" smtClean="0"/>
-              <a:t>22/01/2020</a:t>
+              <a:t>26/03/2020</a:t>
             </a:fld>
             <a:endParaRPr lang="pt-BR"/>
           </a:p>
@@ -1857,7 +1857,7 @@
           <a:p>
             <a:fld id="{89C4B140-6DEB-45EB-A5FE-2FE213A19AB6}" type="datetimeFigureOut">
               <a:rPr lang="pt-BR" smtClean="0"/>
-              <a:t>22/01/2020</a:t>
+              <a:t>26/03/2020</a:t>
             </a:fld>
             <a:endParaRPr lang="pt-BR"/>
           </a:p>
@@ -2263,7 +2263,7 @@
           <a:p>
             <a:fld id="{89C4B140-6DEB-45EB-A5FE-2FE213A19AB6}" type="datetimeFigureOut">
               <a:rPr lang="pt-BR" smtClean="0"/>
-              <a:t>22/01/2020</a:t>
+              <a:t>26/03/2020</a:t>
             </a:fld>
             <a:endParaRPr lang="pt-BR"/>
           </a:p>
@@ -2538,7 +2538,7 @@
           <a:p>
             <a:fld id="{89C4B140-6DEB-45EB-A5FE-2FE213A19AB6}" type="datetimeFigureOut">
               <a:rPr lang="pt-BR" smtClean="0"/>
-              <a:t>22/01/2020</a:t>
+              <a:t>26/03/2020</a:t>
             </a:fld>
             <a:endParaRPr lang="pt-BR"/>
           </a:p>
@@ -2861,7 +2861,7 @@
           <a:p>
             <a:fld id="{89C4B140-6DEB-45EB-A5FE-2FE213A19AB6}" type="datetimeFigureOut">
               <a:rPr lang="pt-BR" smtClean="0"/>
-              <a:t>22/01/2020</a:t>
+              <a:t>26/03/2020</a:t>
             </a:fld>
             <a:endParaRPr lang="pt-BR"/>
           </a:p>
@@ -3324,7 +3324,7 @@
           <a:p>
             <a:fld id="{89C4B140-6DEB-45EB-A5FE-2FE213A19AB6}" type="datetimeFigureOut">
               <a:rPr lang="pt-BR" smtClean="0"/>
-              <a:t>22/01/2020</a:t>
+              <a:t>26/03/2020</a:t>
             </a:fld>
             <a:endParaRPr lang="pt-BR"/>
           </a:p>
@@ -3473,7 +3473,7 @@
           <a:p>
             <a:fld id="{89C4B140-6DEB-45EB-A5FE-2FE213A19AB6}" type="datetimeFigureOut">
               <a:rPr lang="pt-BR" smtClean="0"/>
-              <a:t>22/01/2020</a:t>
+              <a:t>26/03/2020</a:t>
             </a:fld>
             <a:endParaRPr lang="pt-BR"/>
           </a:p>
@@ -3592,7 +3592,7 @@
           <a:p>
             <a:fld id="{89C4B140-6DEB-45EB-A5FE-2FE213A19AB6}" type="datetimeFigureOut">
               <a:rPr lang="pt-BR" smtClean="0"/>
-              <a:t>22/01/2020</a:t>
+              <a:t>26/03/2020</a:t>
             </a:fld>
             <a:endParaRPr lang="pt-BR"/>
           </a:p>
@@ -3900,7 +3900,7 @@
           <a:p>
             <a:fld id="{89C4B140-6DEB-45EB-A5FE-2FE213A19AB6}" type="datetimeFigureOut">
               <a:rPr lang="pt-BR" smtClean="0"/>
-              <a:t>22/01/2020</a:t>
+              <a:t>26/03/2020</a:t>
             </a:fld>
             <a:endParaRPr lang="pt-BR"/>
           </a:p>
@@ -4185,7 +4185,7 @@
           <a:p>
             <a:fld id="{89C4B140-6DEB-45EB-A5FE-2FE213A19AB6}" type="datetimeFigureOut">
               <a:rPr lang="pt-BR" smtClean="0"/>
-              <a:t>22/01/2020</a:t>
+              <a:t>26/03/2020</a:t>
             </a:fld>
             <a:endParaRPr lang="pt-BR"/>
           </a:p>
@@ -4838,14 +4838,26 @@
                 </a:solidFill>
                 <a:latin typeface="Calibri" panose="020F0502020204030204" pitchFamily="34" charset="0"/>
               </a:rPr>
-              <a:t>Lista de exercícios e atividades complementares - </a:t>
-            </a:r>
-            <a:r>
-              <a:rPr lang="pt-BR" sz="1800" dirty="0">
+              <a:t>Lista de exercícios e atividades complementares </a:t>
+            </a:r>
+            <a:r>
+              <a:rPr lang="pt-BR" sz="2400" b="1">
+                <a:solidFill>
+                  <a:srgbClr val="FF0000"/>
+                </a:solidFill>
                 <a:latin typeface="Calibri" panose="020F0502020204030204" pitchFamily="34" charset="0"/>
               </a:rPr>
-              <a:t>AULA: </a:t>
-            </a:r>
+              <a:t>- </a:t>
+            </a:r>
+            <a:r>
+              <a:rPr lang="pt-BR" sz="1800" smtClean="0">
+                <a:latin typeface="Calibri" panose="020F0502020204030204" pitchFamily="34" charset="0"/>
+              </a:rPr>
+              <a:t>AULINHA: </a:t>
+            </a:r>
+            <a:endParaRPr lang="pt-BR" sz="1800" dirty="0">
+              <a:latin typeface="Calibri" panose="020F0502020204030204" pitchFamily="34" charset="0"/>
+            </a:endParaRPr>
           </a:p>
           <a:p>
             <a:r>
@@ -4864,13 +4876,7 @@
               <a:rPr lang="pt-BR" b="1" dirty="0">
                 <a:latin typeface="Calibri" panose="020F0502020204030204" pitchFamily="34" charset="0"/>
               </a:rPr>
-              <a:t>INTRODUÇÃO </a:t>
-            </a:r>
-            <a:r>
-              <a:rPr lang="pt-BR" b="1">
-                <a:latin typeface="Calibri" panose="020F0502020204030204" pitchFamily="34" charset="0"/>
-              </a:rPr>
-              <a:t>À QUALIDADE DE SOFTWARE</a:t>
+              <a:t>INTRODUÇÃO À QUALIDADE DE SOFTWARE</a:t>
             </a:r>
             <a:endParaRPr lang="pt-BR" sz="1800" b="1" dirty="0">
               <a:latin typeface="Calibri" panose="020F0502020204030204" pitchFamily="34" charset="0"/>

</xml_diff>